<commit_message>
add version 7 trace
</commit_message>
<xml_diff>
--- a/resources/images/figure.pptx
+++ b/resources/images/figure.pptx
@@ -9,6 +9,7 @@
     <p:sldId id="272" r:id="rId3"/>
     <p:sldId id="273" r:id="rId4"/>
     <p:sldId id="274" r:id="rId5"/>
+    <p:sldId id="276" r:id="rId6"/>
   </p:sldIdLst>
   <p:sldSz cx="12192000" cy="6858000"/>
   <p:notesSz cx="6858000" cy="9144000"/>
@@ -262,7 +263,7 @@
           <a:p>
             <a:fld id="{964BCF24-A3D0-B444-8485-72F82CCF1CC6}" type="datetimeFigureOut">
               <a:rPr kumimoji="1" lang="ja-JP" altLang="en-US" smtClean="0"/>
-              <a:t>2018/11/30</a:t>
+              <a:t>2018/12/5</a:t>
             </a:fld>
             <a:endParaRPr kumimoji="1" lang="ja-JP" altLang="en-US"/>
           </a:p>
@@ -467,7 +468,7 @@
           <a:p>
             <a:fld id="{964BCF24-A3D0-B444-8485-72F82CCF1CC6}" type="datetimeFigureOut">
               <a:rPr kumimoji="1" lang="ja-JP" altLang="en-US" smtClean="0"/>
-              <a:t>2018/11/30</a:t>
+              <a:t>2018/12/5</a:t>
             </a:fld>
             <a:endParaRPr kumimoji="1" lang="ja-JP" altLang="en-US"/>
           </a:p>
@@ -682,7 +683,7 @@
           <a:p>
             <a:fld id="{964BCF24-A3D0-B444-8485-72F82CCF1CC6}" type="datetimeFigureOut">
               <a:rPr kumimoji="1" lang="ja-JP" altLang="en-US" smtClean="0"/>
-              <a:t>2018/11/30</a:t>
+              <a:t>2018/12/5</a:t>
             </a:fld>
             <a:endParaRPr kumimoji="1" lang="ja-JP" altLang="en-US"/>
           </a:p>
@@ -887,7 +888,7 @@
           <a:p>
             <a:fld id="{964BCF24-A3D0-B444-8485-72F82CCF1CC6}" type="datetimeFigureOut">
               <a:rPr kumimoji="1" lang="ja-JP" altLang="en-US" smtClean="0"/>
-              <a:t>2018/11/30</a:t>
+              <a:t>2018/12/5</a:t>
             </a:fld>
             <a:endParaRPr kumimoji="1" lang="ja-JP" altLang="en-US"/>
           </a:p>
@@ -1197,7 +1198,7 @@
           <a:p>
             <a:fld id="{964BCF24-A3D0-B444-8485-72F82CCF1CC6}" type="datetimeFigureOut">
               <a:rPr kumimoji="1" lang="ja-JP" altLang="en-US" smtClean="0"/>
-              <a:t>2018/11/30</a:t>
+              <a:t>2018/12/5</a:t>
             </a:fld>
             <a:endParaRPr kumimoji="1" lang="ja-JP" altLang="en-US"/>
           </a:p>
@@ -1476,7 +1477,7 @@
           <a:p>
             <a:fld id="{964BCF24-A3D0-B444-8485-72F82CCF1CC6}" type="datetimeFigureOut">
               <a:rPr kumimoji="1" lang="ja-JP" altLang="en-US" smtClean="0"/>
-              <a:t>2018/11/30</a:t>
+              <a:t>2018/12/5</a:t>
             </a:fld>
             <a:endParaRPr kumimoji="1" lang="ja-JP" altLang="en-US"/>
           </a:p>
@@ -1972,7 +1973,7 @@
           <a:p>
             <a:fld id="{964BCF24-A3D0-B444-8485-72F82CCF1CC6}" type="datetimeFigureOut">
               <a:rPr kumimoji="1" lang="ja-JP" altLang="en-US" smtClean="0"/>
-              <a:t>2018/11/30</a:t>
+              <a:t>2018/12/5</a:t>
             </a:fld>
             <a:endParaRPr kumimoji="1" lang="ja-JP" altLang="en-US"/>
           </a:p>
@@ -2113,7 +2114,7 @@
           <a:p>
             <a:fld id="{964BCF24-A3D0-B444-8485-72F82CCF1CC6}" type="datetimeFigureOut">
               <a:rPr kumimoji="1" lang="ja-JP" altLang="en-US" smtClean="0"/>
-              <a:t>2018/11/30</a:t>
+              <a:t>2018/12/5</a:t>
             </a:fld>
             <a:endParaRPr kumimoji="1" lang="ja-JP" altLang="en-US"/>
           </a:p>
@@ -2226,7 +2227,7 @@
           <a:p>
             <a:fld id="{964BCF24-A3D0-B444-8485-72F82CCF1CC6}" type="datetimeFigureOut">
               <a:rPr kumimoji="1" lang="ja-JP" altLang="en-US" smtClean="0"/>
-              <a:t>2018/11/30</a:t>
+              <a:t>2018/12/5</a:t>
             </a:fld>
             <a:endParaRPr kumimoji="1" lang="ja-JP" altLang="en-US"/>
           </a:p>
@@ -2579,7 +2580,7 @@
           <a:p>
             <a:fld id="{964BCF24-A3D0-B444-8485-72F82CCF1CC6}" type="datetimeFigureOut">
               <a:rPr kumimoji="1" lang="ja-JP" altLang="en-US" smtClean="0"/>
-              <a:t>2018/11/30</a:t>
+              <a:t>2018/12/5</a:t>
             </a:fld>
             <a:endParaRPr kumimoji="1" lang="ja-JP" altLang="en-US"/>
           </a:p>
@@ -2902,7 +2903,7 @@
           <a:p>
             <a:fld id="{964BCF24-A3D0-B444-8485-72F82CCF1CC6}" type="datetimeFigureOut">
               <a:rPr kumimoji="1" lang="ja-JP" altLang="en-US" smtClean="0"/>
-              <a:t>2018/11/30</a:t>
+              <a:t>2018/12/5</a:t>
             </a:fld>
             <a:endParaRPr kumimoji="1" lang="ja-JP" altLang="en-US"/>
           </a:p>
@@ -3150,7 +3151,7 @@
           <a:p>
             <a:fld id="{964BCF24-A3D0-B444-8485-72F82CCF1CC6}" type="datetimeFigureOut">
               <a:rPr kumimoji="1" lang="ja-JP" altLang="en-US" smtClean="0"/>
-              <a:t>2018/11/30</a:t>
+              <a:t>2018/12/5</a:t>
             </a:fld>
             <a:endParaRPr kumimoji="1" lang="ja-JP" altLang="en-US"/>
           </a:p>
@@ -5398,7 +5399,7 @@
           <a:p>
             <a:pPr algn="ctr"/>
             <a:r>
-              <a:rPr kumimoji="1" lang="en-US" altLang="ja-JP">
+              <a:rPr kumimoji="1" lang="en-US" altLang="ja-JP" dirty="0">
                 <a:solidFill>
                   <a:sysClr val="windowText" lastClr="000000"/>
                 </a:solidFill>
@@ -5443,6 +5444,781 @@
     <p:extLst>
       <p:ext uri="{BB962C8B-B14F-4D97-AF65-F5344CB8AC3E}">
         <p14:creationId xmlns:p14="http://schemas.microsoft.com/office/powerpoint/2010/main" val="3403913592"/>
+      </p:ext>
+    </p:extLst>
+  </p:cSld>
+  <p:clrMapOvr>
+    <a:masterClrMapping/>
+  </p:clrMapOvr>
+</p:sld>
+</file>
+
+<file path=ppt/slides/slide5.xml><?xml version="1.0" encoding="utf-8"?>
+<p:sld xmlns:a="http://schemas.openxmlformats.org/drawingml/2006/main" xmlns:r="http://schemas.openxmlformats.org/officeDocument/2006/relationships" xmlns:p="http://schemas.openxmlformats.org/presentationml/2006/main">
+  <p:cSld>
+    <p:spTree>
+      <p:nvGrpSpPr>
+        <p:cNvPr id="1" name=""/>
+        <p:cNvGrpSpPr/>
+        <p:nvPr/>
+      </p:nvGrpSpPr>
+      <p:grpSpPr>
+        <a:xfrm>
+          <a:off x="0" y="0"/>
+          <a:ext cx="0" cy="0"/>
+          <a:chOff x="0" y="0"/>
+          <a:chExt cx="0" cy="0"/>
+        </a:xfrm>
+      </p:grpSpPr>
+      <p:pic>
+        <p:nvPicPr>
+          <p:cNvPr id="5" name="コンテンツ プレースホルダー 4">
+            <a:extLst>
+              <a:ext uri="{FF2B5EF4-FFF2-40B4-BE49-F238E27FC236}">
+                <a16:creationId xmlns:a16="http://schemas.microsoft.com/office/drawing/2014/main" id="{E21C4FBD-4A30-374F-9504-81C24671AA04}"/>
+              </a:ext>
+            </a:extLst>
+          </p:cNvPr>
+          <p:cNvPicPr>
+            <a:picLocks noGrp="1" noChangeAspect="1"/>
+          </p:cNvPicPr>
+          <p:nvPr>
+            <p:ph idx="1"/>
+          </p:nvPr>
+        </p:nvPicPr>
+        <p:blipFill>
+          <a:blip r:embed="rId2"/>
+          <a:stretch>
+            <a:fillRect/>
+          </a:stretch>
+        </p:blipFill>
+        <p:spPr>
+          <a:xfrm>
+            <a:off x="3570013" y="1497851"/>
+            <a:ext cx="4010253" cy="1579086"/>
+          </a:xfrm>
+        </p:spPr>
+      </p:pic>
+      <p:sp>
+        <p:nvSpPr>
+          <p:cNvPr id="6" name="右カーブ矢印 5">
+            <a:extLst>
+              <a:ext uri="{FF2B5EF4-FFF2-40B4-BE49-F238E27FC236}">
+                <a16:creationId xmlns:a16="http://schemas.microsoft.com/office/drawing/2014/main" id="{D896EE46-05F9-9347-BB76-31F6551D38CF}"/>
+              </a:ext>
+            </a:extLst>
+          </p:cNvPr>
+          <p:cNvSpPr/>
+          <p:nvPr/>
+        </p:nvSpPr>
+        <p:spPr>
+          <a:xfrm>
+            <a:off x="2855386" y="2874743"/>
+            <a:ext cx="464282" cy="942536"/>
+          </a:xfrm>
+          <a:prstGeom prst="curvedRightArrow">
+            <a:avLst/>
+          </a:prstGeom>
+          <a:solidFill>
+            <a:schemeClr val="accent1">
+              <a:lumMod val="60000"/>
+              <a:lumOff val="40000"/>
+            </a:schemeClr>
+          </a:solidFill>
+          <a:ln>
+            <a:solidFill>
+              <a:schemeClr val="tx1"/>
+            </a:solidFill>
+          </a:ln>
+        </p:spPr>
+        <p:style>
+          <a:lnRef idx="2">
+            <a:schemeClr val="accent1">
+              <a:shade val="50000"/>
+            </a:schemeClr>
+          </a:lnRef>
+          <a:fillRef idx="1">
+            <a:schemeClr val="accent1"/>
+          </a:fillRef>
+          <a:effectRef idx="0">
+            <a:schemeClr val="accent1"/>
+          </a:effectRef>
+          <a:fontRef idx="minor">
+            <a:schemeClr val="lt1"/>
+          </a:fontRef>
+        </p:style>
+        <p:txBody>
+          <a:bodyPr rtlCol="0" anchor="ctr"/>
+          <a:lstStyle/>
+          <a:p>
+            <a:pPr algn="ctr"/>
+            <a:endParaRPr kumimoji="1" lang="ja-JP" altLang="en-US">
+              <a:solidFill>
+                <a:schemeClr val="tx1"/>
+              </a:solidFill>
+            </a:endParaRPr>
+          </a:p>
+        </p:txBody>
+      </p:sp>
+      <p:sp>
+        <p:nvSpPr>
+          <p:cNvPr id="7" name="テキスト ボックス 6">
+            <a:extLst>
+              <a:ext uri="{FF2B5EF4-FFF2-40B4-BE49-F238E27FC236}">
+                <a16:creationId xmlns:a16="http://schemas.microsoft.com/office/drawing/2014/main" id="{81331948-4C0E-0641-8B04-E47640E190AC}"/>
+              </a:ext>
+            </a:extLst>
+          </p:cNvPr>
+          <p:cNvSpPr txBox="1"/>
+          <p:nvPr/>
+        </p:nvSpPr>
+        <p:spPr>
+          <a:xfrm>
+            <a:off x="1884718" y="3076937"/>
+            <a:ext cx="1125415" cy="369332"/>
+          </a:xfrm>
+          <a:prstGeom prst="rect">
+            <a:avLst/>
+          </a:prstGeom>
+          <a:noFill/>
+        </p:spPr>
+        <p:txBody>
+          <a:bodyPr wrap="square" rtlCol="0">
+            <a:spAutoFit/>
+          </a:bodyPr>
+          <a:lstStyle/>
+          <a:p>
+            <a:r>
+              <a:rPr kumimoji="1" lang="en-US" altLang="ja-JP" dirty="0">
+                <a:latin typeface="Calisto MT" panose="02040603050505030304" pitchFamily="18" charset="0"/>
+              </a:rPr>
+              <a:t>2500 AS</a:t>
+            </a:r>
+            <a:endParaRPr kumimoji="1" lang="ja-JP" altLang="en-US">
+              <a:latin typeface="Calisto MT" panose="02040603050505030304" pitchFamily="18" charset="0"/>
+            </a:endParaRPr>
+          </a:p>
+        </p:txBody>
+      </p:sp>
+      <p:pic>
+        <p:nvPicPr>
+          <p:cNvPr id="8" name="コンテンツ プレースホルダー 4">
+            <a:extLst>
+              <a:ext uri="{FF2B5EF4-FFF2-40B4-BE49-F238E27FC236}">
+                <a16:creationId xmlns:a16="http://schemas.microsoft.com/office/drawing/2014/main" id="{FA78D5FF-F443-1F4A-98BB-851E4920BC01}"/>
+              </a:ext>
+            </a:extLst>
+          </p:cNvPr>
+          <p:cNvPicPr>
+            <a:picLocks noChangeAspect="1"/>
+          </p:cNvPicPr>
+          <p:nvPr/>
+        </p:nvPicPr>
+        <p:blipFill>
+          <a:blip r:embed="rId2"/>
+          <a:stretch>
+            <a:fillRect/>
+          </a:stretch>
+        </p:blipFill>
+        <p:spPr>
+          <a:xfrm>
+            <a:off x="3570013" y="3346011"/>
+            <a:ext cx="4010253" cy="1579086"/>
+          </a:xfrm>
+          <a:prstGeom prst="rect">
+            <a:avLst/>
+          </a:prstGeom>
+        </p:spPr>
+      </p:pic>
+      <p:sp>
+        <p:nvSpPr>
+          <p:cNvPr id="9" name="右カーブ矢印 8">
+            <a:extLst>
+              <a:ext uri="{FF2B5EF4-FFF2-40B4-BE49-F238E27FC236}">
+                <a16:creationId xmlns:a16="http://schemas.microsoft.com/office/drawing/2014/main" id="{CD31D0DE-F90E-0F4A-86AD-99CE4490E20E}"/>
+              </a:ext>
+            </a:extLst>
+          </p:cNvPr>
+          <p:cNvSpPr/>
+          <p:nvPr/>
+        </p:nvSpPr>
+        <p:spPr>
+          <a:xfrm rot="10800000">
+            <a:off x="7830611" y="2874743"/>
+            <a:ext cx="464282" cy="942536"/>
+          </a:xfrm>
+          <a:prstGeom prst="curvedRightArrow">
+            <a:avLst/>
+          </a:prstGeom>
+          <a:solidFill>
+            <a:schemeClr val="accent1">
+              <a:lumMod val="60000"/>
+              <a:lumOff val="40000"/>
+            </a:schemeClr>
+          </a:solidFill>
+          <a:ln>
+            <a:solidFill>
+              <a:schemeClr val="tx1"/>
+            </a:solidFill>
+          </a:ln>
+        </p:spPr>
+        <p:style>
+          <a:lnRef idx="2">
+            <a:schemeClr val="accent1">
+              <a:shade val="50000"/>
+            </a:schemeClr>
+          </a:lnRef>
+          <a:fillRef idx="1">
+            <a:schemeClr val="accent1"/>
+          </a:fillRef>
+          <a:effectRef idx="0">
+            <a:schemeClr val="accent1"/>
+          </a:effectRef>
+          <a:fontRef idx="minor">
+            <a:schemeClr val="lt1"/>
+          </a:fontRef>
+        </p:style>
+        <p:txBody>
+          <a:bodyPr rtlCol="0" anchor="ctr"/>
+          <a:lstStyle/>
+          <a:p>
+            <a:pPr algn="ctr"/>
+            <a:endParaRPr kumimoji="1" lang="ja-JP" altLang="en-US">
+              <a:solidFill>
+                <a:schemeClr val="tx1"/>
+              </a:solidFill>
+            </a:endParaRPr>
+          </a:p>
+        </p:txBody>
+      </p:sp>
+      <p:sp>
+        <p:nvSpPr>
+          <p:cNvPr id="10" name="テキスト ボックス 9">
+            <a:extLst>
+              <a:ext uri="{FF2B5EF4-FFF2-40B4-BE49-F238E27FC236}">
+                <a16:creationId xmlns:a16="http://schemas.microsoft.com/office/drawing/2014/main" id="{E3F3DEFD-18FD-214B-8232-76C6A9FAB588}"/>
+              </a:ext>
+            </a:extLst>
+          </p:cNvPr>
+          <p:cNvSpPr txBox="1"/>
+          <p:nvPr/>
+        </p:nvSpPr>
+        <p:spPr>
+          <a:xfrm>
+            <a:off x="8294893" y="3076937"/>
+            <a:ext cx="1125415" cy="369332"/>
+          </a:xfrm>
+          <a:prstGeom prst="rect">
+            <a:avLst/>
+          </a:prstGeom>
+          <a:noFill/>
+        </p:spPr>
+        <p:txBody>
+          <a:bodyPr wrap="square" rtlCol="0">
+            <a:spAutoFit/>
+          </a:bodyPr>
+          <a:lstStyle/>
+          <a:p>
+            <a:r>
+              <a:rPr kumimoji="1" lang="en-US" altLang="ja-JP" dirty="0">
+                <a:latin typeface="Calisto MT" panose="02040603050505030304" pitchFamily="18" charset="0"/>
+              </a:rPr>
+              <a:t>5000 AS</a:t>
+            </a:r>
+            <a:endParaRPr kumimoji="1" lang="ja-JP" altLang="en-US">
+              <a:latin typeface="Calisto MT" panose="02040603050505030304" pitchFamily="18" charset="0"/>
+            </a:endParaRPr>
+          </a:p>
+        </p:txBody>
+      </p:sp>
+      <p:sp>
+        <p:nvSpPr>
+          <p:cNvPr id="11" name="円形吹き出し 10">
+            <a:extLst>
+              <a:ext uri="{FF2B5EF4-FFF2-40B4-BE49-F238E27FC236}">
+                <a16:creationId xmlns:a16="http://schemas.microsoft.com/office/drawing/2014/main" id="{4EC6B7A3-E148-2A44-943A-F95EBFABCFDA}"/>
+              </a:ext>
+            </a:extLst>
+          </p:cNvPr>
+          <p:cNvSpPr/>
+          <p:nvPr/>
+        </p:nvSpPr>
+        <p:spPr>
+          <a:xfrm>
+            <a:off x="6494179" y="555315"/>
+            <a:ext cx="1336431" cy="942536"/>
+          </a:xfrm>
+          <a:prstGeom prst="wedgeEllipseCallout">
+            <a:avLst>
+              <a:gd name="adj1" fmla="val -63343"/>
+              <a:gd name="adj2" fmla="val 111073"/>
+            </a:avLst>
+          </a:prstGeom>
+          <a:solidFill>
+            <a:schemeClr val="bg1">
+              <a:lumMod val="75000"/>
+            </a:schemeClr>
+          </a:solidFill>
+          <a:ln>
+            <a:solidFill>
+              <a:schemeClr val="tx1">
+                <a:lumMod val="85000"/>
+                <a:lumOff val="15000"/>
+              </a:schemeClr>
+            </a:solidFill>
+          </a:ln>
+        </p:spPr>
+        <p:style>
+          <a:lnRef idx="2">
+            <a:schemeClr val="accent1">
+              <a:shade val="50000"/>
+            </a:schemeClr>
+          </a:lnRef>
+          <a:fillRef idx="1">
+            <a:schemeClr val="accent1"/>
+          </a:fillRef>
+          <a:effectRef idx="0">
+            <a:schemeClr val="accent1"/>
+          </a:effectRef>
+          <a:fontRef idx="minor">
+            <a:schemeClr val="lt1"/>
+          </a:fontRef>
+        </p:style>
+        <p:txBody>
+          <a:bodyPr rtlCol="0" anchor="ctr"/>
+          <a:lstStyle/>
+          <a:p>
+            <a:pPr algn="ctr"/>
+            <a:r>
+              <a:rPr kumimoji="1" lang="en-US" altLang="ja-JP" dirty="0">
+                <a:solidFill>
+                  <a:sysClr val="windowText" lastClr="000000"/>
+                </a:solidFill>
+                <a:latin typeface="Calisto MT" panose="02040603050505030304" pitchFamily="18" charset="0"/>
+              </a:rPr>
+              <a:t>Success</a:t>
+            </a:r>
+          </a:p>
+          <a:p>
+            <a:pPr algn="ctr"/>
+            <a:r>
+              <a:rPr lang="en-US" altLang="ja-JP" dirty="0">
+                <a:solidFill>
+                  <a:sysClr val="windowText" lastClr="000000"/>
+                </a:solidFill>
+                <a:latin typeface="Calisto MT" panose="02040603050505030304" pitchFamily="18" charset="0"/>
+              </a:rPr>
+              <a:t>1.0</a:t>
+            </a:r>
+            <a:endParaRPr kumimoji="1" lang="ja-JP" altLang="en-US">
+              <a:solidFill>
+                <a:sysClr val="windowText" lastClr="000000"/>
+              </a:solidFill>
+              <a:latin typeface="Calisto MT" panose="02040603050505030304" pitchFamily="18" charset="0"/>
+            </a:endParaRPr>
+          </a:p>
+        </p:txBody>
+      </p:sp>
+      <p:sp>
+        <p:nvSpPr>
+          <p:cNvPr id="12" name="右矢印 11">
+            <a:extLst>
+              <a:ext uri="{FF2B5EF4-FFF2-40B4-BE49-F238E27FC236}">
+                <a16:creationId xmlns:a16="http://schemas.microsoft.com/office/drawing/2014/main" id="{ABC8E10B-4498-754B-A481-35782A437E3B}"/>
+              </a:ext>
+            </a:extLst>
+          </p:cNvPr>
+          <p:cNvSpPr/>
+          <p:nvPr/>
+        </p:nvSpPr>
+        <p:spPr>
+          <a:xfrm>
+            <a:off x="6095998" y="2067475"/>
+            <a:ext cx="246927" cy="439838"/>
+          </a:xfrm>
+          <a:prstGeom prst="rightArrow">
+            <a:avLst/>
+          </a:prstGeom>
+          <a:solidFill>
+            <a:schemeClr val="tx1"/>
+          </a:solidFill>
+          <a:ln>
+            <a:solidFill>
+              <a:schemeClr val="tx1"/>
+            </a:solidFill>
+          </a:ln>
+        </p:spPr>
+        <p:style>
+          <a:lnRef idx="2">
+            <a:schemeClr val="accent1">
+              <a:shade val="50000"/>
+            </a:schemeClr>
+          </a:lnRef>
+          <a:fillRef idx="1">
+            <a:schemeClr val="accent1"/>
+          </a:fillRef>
+          <a:effectRef idx="0">
+            <a:schemeClr val="accent1"/>
+          </a:effectRef>
+          <a:fontRef idx="minor">
+            <a:schemeClr val="lt1"/>
+          </a:fontRef>
+        </p:style>
+        <p:txBody>
+          <a:bodyPr rtlCol="0" anchor="ctr"/>
+          <a:lstStyle/>
+          <a:p>
+            <a:pPr algn="ctr"/>
+            <a:endParaRPr kumimoji="1" lang="ja-JP" altLang="en-US"/>
+          </a:p>
+        </p:txBody>
+      </p:sp>
+      <p:sp>
+        <p:nvSpPr>
+          <p:cNvPr id="13" name="右矢印 12">
+            <a:extLst>
+              <a:ext uri="{FF2B5EF4-FFF2-40B4-BE49-F238E27FC236}">
+                <a16:creationId xmlns:a16="http://schemas.microsoft.com/office/drawing/2014/main" id="{90AAE2C3-DC92-4E4F-91C6-A42141D117DA}"/>
+              </a:ext>
+            </a:extLst>
+          </p:cNvPr>
+          <p:cNvSpPr/>
+          <p:nvPr/>
+        </p:nvSpPr>
+        <p:spPr>
+          <a:xfrm>
+            <a:off x="6095997" y="3915635"/>
+            <a:ext cx="246927" cy="439838"/>
+          </a:xfrm>
+          <a:prstGeom prst="rightArrow">
+            <a:avLst/>
+          </a:prstGeom>
+          <a:solidFill>
+            <a:schemeClr val="tx1"/>
+          </a:solidFill>
+          <a:ln>
+            <a:solidFill>
+              <a:schemeClr val="tx1"/>
+            </a:solidFill>
+          </a:ln>
+        </p:spPr>
+        <p:style>
+          <a:lnRef idx="2">
+            <a:schemeClr val="accent1">
+              <a:shade val="50000"/>
+            </a:schemeClr>
+          </a:lnRef>
+          <a:fillRef idx="1">
+            <a:schemeClr val="accent1"/>
+          </a:fillRef>
+          <a:effectRef idx="0">
+            <a:schemeClr val="accent1"/>
+          </a:effectRef>
+          <a:fontRef idx="minor">
+            <a:schemeClr val="lt1"/>
+          </a:fontRef>
+        </p:style>
+        <p:txBody>
+          <a:bodyPr rtlCol="0" anchor="ctr"/>
+          <a:lstStyle/>
+          <a:p>
+            <a:pPr algn="ctr"/>
+            <a:endParaRPr kumimoji="1" lang="ja-JP" altLang="en-US"/>
+          </a:p>
+        </p:txBody>
+      </p:sp>
+      <p:sp>
+        <p:nvSpPr>
+          <p:cNvPr id="14" name="円形吹き出し 13">
+            <a:extLst>
+              <a:ext uri="{FF2B5EF4-FFF2-40B4-BE49-F238E27FC236}">
+                <a16:creationId xmlns:a16="http://schemas.microsoft.com/office/drawing/2014/main" id="{27A28768-E58B-2E42-B411-598BDC62A8B7}"/>
+              </a:ext>
+            </a:extLst>
+          </p:cNvPr>
+          <p:cNvSpPr/>
+          <p:nvPr/>
+        </p:nvSpPr>
+        <p:spPr>
+          <a:xfrm>
+            <a:off x="6494179" y="4722903"/>
+            <a:ext cx="1336431" cy="942536"/>
+          </a:xfrm>
+          <a:prstGeom prst="wedgeEllipseCallout">
+            <a:avLst>
+              <a:gd name="adj1" fmla="val -63343"/>
+              <a:gd name="adj2" fmla="val -84185"/>
+            </a:avLst>
+          </a:prstGeom>
+          <a:solidFill>
+            <a:schemeClr val="bg1">
+              <a:lumMod val="75000"/>
+            </a:schemeClr>
+          </a:solidFill>
+          <a:ln>
+            <a:solidFill>
+              <a:schemeClr val="tx1">
+                <a:lumMod val="85000"/>
+                <a:lumOff val="15000"/>
+              </a:schemeClr>
+            </a:solidFill>
+          </a:ln>
+        </p:spPr>
+        <p:style>
+          <a:lnRef idx="2">
+            <a:schemeClr val="accent1">
+              <a:shade val="50000"/>
+            </a:schemeClr>
+          </a:lnRef>
+          <a:fillRef idx="1">
+            <a:schemeClr val="accent1"/>
+          </a:fillRef>
+          <a:effectRef idx="0">
+            <a:schemeClr val="accent1"/>
+          </a:effectRef>
+          <a:fontRef idx="minor">
+            <a:schemeClr val="lt1"/>
+          </a:fontRef>
+        </p:style>
+        <p:txBody>
+          <a:bodyPr rtlCol="0" anchor="ctr"/>
+          <a:lstStyle/>
+          <a:p>
+            <a:pPr algn="ctr"/>
+            <a:r>
+              <a:rPr kumimoji="1" lang="en-US" altLang="ja-JP" dirty="0">
+                <a:solidFill>
+                  <a:sysClr val="windowText" lastClr="000000"/>
+                </a:solidFill>
+                <a:latin typeface="Calisto MT" panose="02040603050505030304" pitchFamily="18" charset="0"/>
+              </a:rPr>
+              <a:t>Success</a:t>
+            </a:r>
+          </a:p>
+          <a:p>
+            <a:pPr algn="ctr"/>
+            <a:r>
+              <a:rPr lang="en-US" altLang="ja-JP" dirty="0">
+                <a:solidFill>
+                  <a:sysClr val="windowText" lastClr="000000"/>
+                </a:solidFill>
+                <a:latin typeface="Calisto MT" panose="02040603050505030304" pitchFamily="18" charset="0"/>
+              </a:rPr>
+              <a:t>0.7</a:t>
+            </a:r>
+            <a:endParaRPr kumimoji="1" lang="ja-JP" altLang="en-US">
+              <a:solidFill>
+                <a:sysClr val="windowText" lastClr="000000"/>
+              </a:solidFill>
+              <a:latin typeface="Calisto MT" panose="02040603050505030304" pitchFamily="18" charset="0"/>
+            </a:endParaRPr>
+          </a:p>
+        </p:txBody>
+      </p:sp>
+      <p:sp>
+        <p:nvSpPr>
+          <p:cNvPr id="15" name="円形吹き出し 14">
+            <a:extLst>
+              <a:ext uri="{FF2B5EF4-FFF2-40B4-BE49-F238E27FC236}">
+                <a16:creationId xmlns:a16="http://schemas.microsoft.com/office/drawing/2014/main" id="{6CEC4004-1624-EC42-909A-81E87FC5ED2D}"/>
+              </a:ext>
+            </a:extLst>
+          </p:cNvPr>
+          <p:cNvSpPr/>
+          <p:nvPr/>
+        </p:nvSpPr>
+        <p:spPr>
+          <a:xfrm>
+            <a:off x="7450569" y="555315"/>
+            <a:ext cx="1336431" cy="942536"/>
+          </a:xfrm>
+          <a:prstGeom prst="wedgeEllipseCallout">
+            <a:avLst>
+              <a:gd name="adj1" fmla="val -63343"/>
+              <a:gd name="adj2" fmla="val 111073"/>
+            </a:avLst>
+          </a:prstGeom>
+          <a:solidFill>
+            <a:schemeClr val="bg1">
+              <a:lumMod val="75000"/>
+            </a:schemeClr>
+          </a:solidFill>
+          <a:ln>
+            <a:solidFill>
+              <a:schemeClr val="tx1">
+                <a:lumMod val="85000"/>
+                <a:lumOff val="15000"/>
+              </a:schemeClr>
+            </a:solidFill>
+          </a:ln>
+        </p:spPr>
+        <p:style>
+          <a:lnRef idx="2">
+            <a:schemeClr val="accent1">
+              <a:shade val="50000"/>
+            </a:schemeClr>
+          </a:lnRef>
+          <a:fillRef idx="1">
+            <a:schemeClr val="accent1"/>
+          </a:fillRef>
+          <a:effectRef idx="0">
+            <a:schemeClr val="accent1"/>
+          </a:effectRef>
+          <a:fontRef idx="minor">
+            <a:schemeClr val="lt1"/>
+          </a:fontRef>
+        </p:style>
+        <p:txBody>
+          <a:bodyPr rtlCol="0" anchor="ctr"/>
+          <a:lstStyle/>
+          <a:p>
+            <a:pPr algn="ctr"/>
+            <a:r>
+              <a:rPr kumimoji="1" lang="en-US" altLang="ja-JP" dirty="0">
+                <a:solidFill>
+                  <a:sysClr val="windowText" lastClr="000000"/>
+                </a:solidFill>
+                <a:latin typeface="Calisto MT" panose="02040603050505030304" pitchFamily="18" charset="0"/>
+              </a:rPr>
+              <a:t>pick</a:t>
+            </a:r>
+          </a:p>
+          <a:p>
+            <a:pPr algn="ctr"/>
+            <a:r>
+              <a:rPr kumimoji="1" lang="en-US" altLang="ja-JP" dirty="0">
+                <a:solidFill>
+                  <a:sysClr val="windowText" lastClr="000000"/>
+                </a:solidFill>
+                <a:latin typeface="Calisto MT" panose="02040603050505030304" pitchFamily="18" charset="0"/>
+              </a:rPr>
+              <a:t>Success</a:t>
+            </a:r>
+          </a:p>
+          <a:p>
+            <a:pPr algn="ctr"/>
+            <a:r>
+              <a:rPr lang="en-US" altLang="ja-JP" dirty="0">
+                <a:solidFill>
+                  <a:sysClr val="windowText" lastClr="000000"/>
+                </a:solidFill>
+                <a:latin typeface="Calisto MT" panose="02040603050505030304" pitchFamily="18" charset="0"/>
+              </a:rPr>
+              <a:t>1.0</a:t>
+            </a:r>
+            <a:endParaRPr kumimoji="1" lang="ja-JP" altLang="en-US">
+              <a:solidFill>
+                <a:sysClr val="windowText" lastClr="000000"/>
+              </a:solidFill>
+              <a:latin typeface="Calisto MT" panose="02040603050505030304" pitchFamily="18" charset="0"/>
+            </a:endParaRPr>
+          </a:p>
+        </p:txBody>
+      </p:sp>
+      <p:sp>
+        <p:nvSpPr>
+          <p:cNvPr id="16" name="円形吹き出し 15">
+            <a:extLst>
+              <a:ext uri="{FF2B5EF4-FFF2-40B4-BE49-F238E27FC236}">
+                <a16:creationId xmlns:a16="http://schemas.microsoft.com/office/drawing/2014/main" id="{7574CF46-3611-3E4E-B64E-DC2CFB4B853F}"/>
+              </a:ext>
+            </a:extLst>
+          </p:cNvPr>
+          <p:cNvSpPr/>
+          <p:nvPr/>
+        </p:nvSpPr>
+        <p:spPr>
+          <a:xfrm>
+            <a:off x="7626677" y="4925097"/>
+            <a:ext cx="1336431" cy="942536"/>
+          </a:xfrm>
+          <a:prstGeom prst="wedgeEllipseCallout">
+            <a:avLst>
+              <a:gd name="adj1" fmla="val -63343"/>
+              <a:gd name="adj2" fmla="val -84185"/>
+            </a:avLst>
+          </a:prstGeom>
+          <a:solidFill>
+            <a:schemeClr val="bg1">
+              <a:lumMod val="75000"/>
+            </a:schemeClr>
+          </a:solidFill>
+          <a:ln>
+            <a:solidFill>
+              <a:schemeClr val="tx1">
+                <a:lumMod val="85000"/>
+                <a:lumOff val="15000"/>
+              </a:schemeClr>
+            </a:solidFill>
+          </a:ln>
+        </p:spPr>
+        <p:style>
+          <a:lnRef idx="2">
+            <a:schemeClr val="accent1">
+              <a:shade val="50000"/>
+            </a:schemeClr>
+          </a:lnRef>
+          <a:fillRef idx="1">
+            <a:schemeClr val="accent1"/>
+          </a:fillRef>
+          <a:effectRef idx="0">
+            <a:schemeClr val="accent1"/>
+          </a:effectRef>
+          <a:fontRef idx="minor">
+            <a:schemeClr val="lt1"/>
+          </a:fontRef>
+        </p:style>
+        <p:txBody>
+          <a:bodyPr rtlCol="0" anchor="ctr"/>
+          <a:lstStyle/>
+          <a:p>
+            <a:pPr algn="ctr"/>
+            <a:r>
+              <a:rPr kumimoji="1" lang="en-US" altLang="ja-JP" dirty="0">
+                <a:solidFill>
+                  <a:sysClr val="windowText" lastClr="000000"/>
+                </a:solidFill>
+                <a:latin typeface="Calisto MT" panose="02040603050505030304" pitchFamily="18" charset="0"/>
+              </a:rPr>
+              <a:t>pick</a:t>
+            </a:r>
+          </a:p>
+          <a:p>
+            <a:pPr algn="ctr"/>
+            <a:r>
+              <a:rPr kumimoji="1" lang="en-US" altLang="ja-JP" dirty="0">
+                <a:solidFill>
+                  <a:sysClr val="windowText" lastClr="000000"/>
+                </a:solidFill>
+                <a:latin typeface="Calisto MT" panose="02040603050505030304" pitchFamily="18" charset="0"/>
+              </a:rPr>
+              <a:t>Success</a:t>
+            </a:r>
+          </a:p>
+          <a:p>
+            <a:pPr algn="ctr"/>
+            <a:r>
+              <a:rPr lang="en-US" altLang="ja-JP" dirty="0">
+                <a:solidFill>
+                  <a:sysClr val="windowText" lastClr="000000"/>
+                </a:solidFill>
+                <a:latin typeface="Calisto MT" panose="02040603050505030304" pitchFamily="18" charset="0"/>
+              </a:rPr>
+              <a:t>0.7</a:t>
+            </a:r>
+            <a:endParaRPr kumimoji="1" lang="ja-JP" altLang="en-US">
+              <a:solidFill>
+                <a:sysClr val="windowText" lastClr="000000"/>
+              </a:solidFill>
+              <a:latin typeface="Calisto MT" panose="02040603050505030304" pitchFamily="18" charset="0"/>
+            </a:endParaRPr>
+          </a:p>
+        </p:txBody>
+      </p:sp>
+    </p:spTree>
+    <p:extLst>
+      <p:ext uri="{BB962C8B-B14F-4D97-AF65-F5344CB8AC3E}">
+        <p14:creationId xmlns:p14="http://schemas.microsoft.com/office/powerpoint/2010/main" val="1990549862"/>
       </p:ext>
     </p:extLst>
   </p:cSld>

</xml_diff>